<commit_message>
Add medal challenges to learning logs
</commit_message>
<xml_diff>
--- a/docs/Year1/BlockB/MS Teams Assignment Template/Learning Log - Y1B_2022-23_ADSAI.pptx
+++ b/docs/Year1/BlockB/MS Teams Assignment Template/Learning Log - Y1B_2022-23_ADSAI.pptx
@@ -5,7 +5,7 @@
     <p:sldMasterId id="2147483658" r:id="rId4"/>
   </p:sldMasterIdLst>
   <p:notesMasterIdLst>
-    <p:notesMasterId r:id="rId46"/>
+    <p:notesMasterId r:id="rId48"/>
   </p:notesMasterIdLst>
   <p:sldIdLst>
     <p:sldId id="256" r:id="rId5"/>
@@ -46,65 +46,67 @@
     <p:sldId id="303" r:id="rId40"/>
     <p:sldId id="306" r:id="rId41"/>
     <p:sldId id="307" r:id="rId42"/>
-    <p:sldId id="296" r:id="rId43"/>
-    <p:sldId id="297" r:id="rId44"/>
-    <p:sldId id="298" r:id="rId45"/>
+    <p:sldId id="333" r:id="rId43"/>
+    <p:sldId id="334" r:id="rId44"/>
+    <p:sldId id="296" r:id="rId45"/>
+    <p:sldId id="297" r:id="rId46"/>
+    <p:sldId id="298" r:id="rId47"/>
   </p:sldIdLst>
   <p:sldSz cx="9144000" cy="5143500" type="screen16x9"/>
   <p:notesSz cx="6858000" cy="9144000"/>
   <p:embeddedFontLst>
     <p:embeddedFont>
       <p:font typeface="Alfa Slab One" panose="020B0604020202020204" charset="0"/>
-      <p:regular r:id="rId47"/>
+      <p:regular r:id="rId49"/>
     </p:embeddedFont>
     <p:embeddedFont>
       <p:font typeface="Helvetica Neue" panose="020B0604020202020204" charset="0"/>
-      <p:regular r:id="rId48"/>
-      <p:bold r:id="rId49"/>
-      <p:italic r:id="rId50"/>
-      <p:boldItalic r:id="rId51"/>
+      <p:regular r:id="rId50"/>
+      <p:bold r:id="rId51"/>
+      <p:italic r:id="rId52"/>
+      <p:boldItalic r:id="rId53"/>
     </p:embeddedFont>
     <p:embeddedFont>
       <p:font typeface="Open Sans" panose="020B0606030504020204" pitchFamily="34" charset="0"/>
-      <p:regular r:id="rId52"/>
-      <p:bold r:id="rId53"/>
-      <p:italic r:id="rId54"/>
-      <p:boldItalic r:id="rId55"/>
+      <p:regular r:id="rId54"/>
+      <p:bold r:id="rId55"/>
+      <p:italic r:id="rId56"/>
+      <p:boldItalic r:id="rId57"/>
     </p:embeddedFont>
     <p:embeddedFont>
       <p:font typeface="Proxima Nova" panose="020B0604020202020204" charset="0"/>
-      <p:regular r:id="rId56"/>
-      <p:bold r:id="rId57"/>
-      <p:italic r:id="rId58"/>
-      <p:boldItalic r:id="rId59"/>
+      <p:regular r:id="rId58"/>
+      <p:bold r:id="rId59"/>
+      <p:italic r:id="rId60"/>
+      <p:boldItalic r:id="rId61"/>
     </p:embeddedFont>
     <p:embeddedFont>
       <p:font typeface="Roboto" panose="02000000000000000000" pitchFamily="2" charset="0"/>
-      <p:regular r:id="rId60"/>
-      <p:bold r:id="rId61"/>
-      <p:italic r:id="rId62"/>
-      <p:boldItalic r:id="rId63"/>
+      <p:regular r:id="rId62"/>
+      <p:bold r:id="rId63"/>
+      <p:italic r:id="rId64"/>
+      <p:boldItalic r:id="rId65"/>
     </p:embeddedFont>
     <p:embeddedFont>
       <p:font typeface="Roboto Light" panose="02000000000000000000" pitchFamily="2" charset="0"/>
-      <p:regular r:id="rId64"/>
-      <p:bold r:id="rId65"/>
-      <p:italic r:id="rId66"/>
-      <p:boldItalic r:id="rId67"/>
+      <p:regular r:id="rId66"/>
+      <p:bold r:id="rId67"/>
+      <p:italic r:id="rId68"/>
+      <p:boldItalic r:id="rId69"/>
     </p:embeddedFont>
     <p:embeddedFont>
       <p:font typeface="Roboto Thin" panose="02000000000000000000" pitchFamily="2" charset="0"/>
-      <p:regular r:id="rId68"/>
-      <p:bold r:id="rId69"/>
-      <p:italic r:id="rId70"/>
-      <p:boldItalic r:id="rId71"/>
+      <p:regular r:id="rId70"/>
+      <p:bold r:id="rId71"/>
+      <p:italic r:id="rId72"/>
+      <p:boldItalic r:id="rId73"/>
     </p:embeddedFont>
     <p:embeddedFont>
       <p:font typeface="Segoe UI" panose="020B0502040204020203" pitchFamily="34" charset="0"/>
-      <p:regular r:id="rId72"/>
-      <p:bold r:id="rId73"/>
-      <p:italic r:id="rId74"/>
-      <p:boldItalic r:id="rId75"/>
+      <p:regular r:id="rId74"/>
+      <p:bold r:id="rId75"/>
+      <p:italic r:id="rId76"/>
+      <p:boldItalic r:id="rId77"/>
     </p:embeddedFont>
   </p:embeddedFontLst>
   <p:defaultTextStyle>
@@ -4261,7 +4263,7 @@
   <p:cSld>
     <p:spTree>
       <p:nvGrpSpPr>
-        <p:cNvPr id="1" name="Shape 493"/>
+        <p:cNvPr id="1" name="Shape 463"/>
         <p:cNvGrpSpPr/>
         <p:nvPr/>
       </p:nvGrpSpPr>
@@ -4275,7 +4277,7 @@
       </p:grpSpPr>
       <p:sp>
         <p:nvSpPr>
-          <p:cNvPr id="494" name="Google Shape;494;g6b4f495656_0_753:notes"/>
+          <p:cNvPr id="464" name="Google Shape;464;g6b4f495656_0_721:notes"/>
           <p:cNvSpPr>
             <a:spLocks noGrp="1" noRot="1" noChangeAspect="1"/>
           </p:cNvSpPr>
@@ -4316,7 +4318,7 @@
       </p:sp>
       <p:sp>
         <p:nvSpPr>
-          <p:cNvPr id="495" name="Google Shape;495;g6b4f495656_0_753:notes"/>
+          <p:cNvPr id="465" name="Google Shape;465;g6b4f495656_0_721:notes"/>
           <p:cNvSpPr txBox="1">
             <a:spLocks noGrp="1"/>
           </p:cNvSpPr>
@@ -4348,31 +4350,16 @@
               </a:spcAft>
               <a:buNone/>
             </a:pPr>
-            <a:r>
-              <a:rPr lang="en"/>
-              <a:t>MUST BE COMPLETED IN WEEK 8</a:t>
-            </a:r>
             <a:endParaRPr/>
           </a:p>
-          <a:p>
-            <a:pPr marL="0" lvl="0" indent="0" algn="l" rtl="0">
-              <a:spcBef>
-                <a:spcPts val="0"/>
-              </a:spcBef>
-              <a:spcAft>
-                <a:spcPts val="0"/>
-              </a:spcAft>
-              <a:buNone/>
-            </a:pPr>
-            <a:r>
-              <a:rPr lang="en"/>
-              <a:t>Summative reflection on your progress during the block including a critical assessment of everything you did and learned during the block. This is a comprehensive review of everything recorded in Section B, evaluated against the goals and planning laid out in Section A.</a:t>
-            </a:r>
-            <a:endParaRPr/>
-          </a:p>
         </p:txBody>
       </p:sp>
     </p:spTree>
+    <p:extLst>
+      <p:ext uri="{BB962C8B-B14F-4D97-AF65-F5344CB8AC3E}">
+        <p14:creationId xmlns:p14="http://schemas.microsoft.com/office/powerpoint/2010/main" val="2177648033"/>
+      </p:ext>
+    </p:extLst>
   </p:cSld>
   <p:clrMapOvr>
     <a:masterClrMapping/>
@@ -4541,7 +4528,7 @@
   <p:cSld>
     <p:spTree>
       <p:nvGrpSpPr>
-        <p:cNvPr id="1" name="Shape 500"/>
+        <p:cNvPr id="1" name="Shape 471"/>
         <p:cNvGrpSpPr/>
         <p:nvPr/>
       </p:nvGrpSpPr>
@@ -4555,7 +4542,7 @@
       </p:grpSpPr>
       <p:sp>
         <p:nvSpPr>
-          <p:cNvPr id="501" name="Google Shape;501;g6b602ea5a7_1_212:notes"/>
+          <p:cNvPr id="472" name="Google Shape;472;g6b602ea5a7_1_359:notes"/>
           <p:cNvSpPr>
             <a:spLocks noGrp="1" noRot="1" noChangeAspect="1"/>
           </p:cNvSpPr>
@@ -4596,7 +4583,7 @@
       </p:sp>
       <p:sp>
         <p:nvSpPr>
-          <p:cNvPr id="502" name="Google Shape;502;g6b602ea5a7_1_212:notes"/>
+          <p:cNvPr id="473" name="Google Shape;473;g6b602ea5a7_1_359:notes"/>
           <p:cNvSpPr txBox="1">
             <a:spLocks noGrp="1"/>
           </p:cNvSpPr>
@@ -4628,6 +4615,135 @@
               </a:spcAft>
               <a:buNone/>
             </a:pPr>
+            <a:endParaRPr/>
+          </a:p>
+        </p:txBody>
+      </p:sp>
+    </p:spTree>
+    <p:extLst>
+      <p:ext uri="{BB962C8B-B14F-4D97-AF65-F5344CB8AC3E}">
+        <p14:creationId xmlns:p14="http://schemas.microsoft.com/office/powerpoint/2010/main" val="700268424"/>
+      </p:ext>
+    </p:extLst>
+  </p:cSld>
+  <p:clrMapOvr>
+    <a:masterClrMapping/>
+  </p:clrMapOvr>
+</p:notes>
+</file>
+
+<file path=ppt/notesSlides/notesSlide41.xml><?xml version="1.0" encoding="utf-8"?>
+<p:notes xmlns:a="http://schemas.openxmlformats.org/drawingml/2006/main" xmlns:r="http://schemas.openxmlformats.org/officeDocument/2006/relationships" xmlns:p="http://schemas.openxmlformats.org/presentationml/2006/main" showMasterSp="0" showMasterPhAnim="0">
+  <p:cSld>
+    <p:spTree>
+      <p:nvGrpSpPr>
+        <p:cNvPr id="1" name="Shape 493"/>
+        <p:cNvGrpSpPr/>
+        <p:nvPr/>
+      </p:nvGrpSpPr>
+      <p:grpSpPr>
+        <a:xfrm>
+          <a:off x="0" y="0"/>
+          <a:ext cx="0" cy="0"/>
+          <a:chOff x="0" y="0"/>
+          <a:chExt cx="0" cy="0"/>
+        </a:xfrm>
+      </p:grpSpPr>
+      <p:sp>
+        <p:nvSpPr>
+          <p:cNvPr id="494" name="Google Shape;494;g6b4f495656_0_753:notes"/>
+          <p:cNvSpPr>
+            <a:spLocks noGrp="1" noRot="1" noChangeAspect="1"/>
+          </p:cNvSpPr>
+          <p:nvPr>
+            <p:ph type="sldImg" idx="2"/>
+          </p:nvPr>
+        </p:nvSpPr>
+        <p:spPr>
+          <a:xfrm>
+            <a:off x="381000" y="685800"/>
+            <a:ext cx="6096000" cy="3429000"/>
+          </a:xfrm>
+          <a:custGeom>
+            <a:avLst/>
+            <a:gdLst/>
+            <a:ahLst/>
+            <a:cxnLst/>
+            <a:rect l="l" t="t" r="r" b="b"/>
+            <a:pathLst>
+              <a:path w="120000" h="120000" extrusionOk="0">
+                <a:moveTo>
+                  <a:pt x="0" y="0"/>
+                </a:moveTo>
+                <a:lnTo>
+                  <a:pt x="120000" y="0"/>
+                </a:lnTo>
+                <a:lnTo>
+                  <a:pt x="120000" y="120000"/>
+                </a:lnTo>
+                <a:lnTo>
+                  <a:pt x="0" y="120000"/>
+                </a:lnTo>
+                <a:close/>
+              </a:path>
+            </a:pathLst>
+          </a:custGeom>
+        </p:spPr>
+      </p:sp>
+      <p:sp>
+        <p:nvSpPr>
+          <p:cNvPr id="495" name="Google Shape;495;g6b4f495656_0_753:notes"/>
+          <p:cNvSpPr txBox="1">
+            <a:spLocks noGrp="1"/>
+          </p:cNvSpPr>
+          <p:nvPr>
+            <p:ph type="body" idx="1"/>
+          </p:nvPr>
+        </p:nvSpPr>
+        <p:spPr>
+          <a:xfrm>
+            <a:off x="685800" y="4343400"/>
+            <a:ext cx="5486400" cy="4114800"/>
+          </a:xfrm>
+          <a:prstGeom prst="rect">
+            <a:avLst/>
+          </a:prstGeom>
+        </p:spPr>
+        <p:txBody>
+          <a:bodyPr spcFirstLastPara="1" wrap="square" lIns="91425" tIns="91425" rIns="91425" bIns="91425" anchor="t" anchorCtr="0">
+            <a:noAutofit/>
+          </a:bodyPr>
+          <a:lstStyle/>
+          <a:p>
+            <a:pPr marL="0" lvl="0" indent="0" algn="l" rtl="0">
+              <a:spcBef>
+                <a:spcPts val="0"/>
+              </a:spcBef>
+              <a:spcAft>
+                <a:spcPts val="0"/>
+              </a:spcAft>
+              <a:buNone/>
+            </a:pPr>
+            <a:r>
+              <a:rPr lang="en"/>
+              <a:t>MUST BE COMPLETED IN WEEK 8</a:t>
+            </a:r>
+            <a:endParaRPr/>
+          </a:p>
+          <a:p>
+            <a:pPr marL="0" lvl="0" indent="0" algn="l" rtl="0">
+              <a:spcBef>
+                <a:spcPts val="0"/>
+              </a:spcBef>
+              <a:spcAft>
+                <a:spcPts val="0"/>
+              </a:spcAft>
+              <a:buNone/>
+            </a:pPr>
+            <a:r>
+              <a:rPr lang="en"/>
+              <a:t>Summative reflection on your progress during the block including a critical assessment of everything you did and learned during the block. This is a comprehensive review of everything recorded in Section B, evaluated against the goals and planning laid out in Section A.</a:t>
+            </a:r>
             <a:endParaRPr/>
           </a:p>
         </p:txBody>
@@ -4640,7 +4756,111 @@
 </p:notes>
 </file>
 
-<file path=ppt/notesSlides/notesSlide41.xml><?xml version="1.0" encoding="utf-8"?>
+<file path=ppt/notesSlides/notesSlide42.xml><?xml version="1.0" encoding="utf-8"?>
+<p:notes xmlns:a="http://schemas.openxmlformats.org/drawingml/2006/main" xmlns:r="http://schemas.openxmlformats.org/officeDocument/2006/relationships" xmlns:p="http://schemas.openxmlformats.org/presentationml/2006/main" showMasterSp="0" showMasterPhAnim="0">
+  <p:cSld>
+    <p:spTree>
+      <p:nvGrpSpPr>
+        <p:cNvPr id="1" name="Shape 500"/>
+        <p:cNvGrpSpPr/>
+        <p:nvPr/>
+      </p:nvGrpSpPr>
+      <p:grpSpPr>
+        <a:xfrm>
+          <a:off x="0" y="0"/>
+          <a:ext cx="0" cy="0"/>
+          <a:chOff x="0" y="0"/>
+          <a:chExt cx="0" cy="0"/>
+        </a:xfrm>
+      </p:grpSpPr>
+      <p:sp>
+        <p:nvSpPr>
+          <p:cNvPr id="501" name="Google Shape;501;g6b602ea5a7_1_212:notes"/>
+          <p:cNvSpPr>
+            <a:spLocks noGrp="1" noRot="1" noChangeAspect="1"/>
+          </p:cNvSpPr>
+          <p:nvPr>
+            <p:ph type="sldImg" idx="2"/>
+          </p:nvPr>
+        </p:nvSpPr>
+        <p:spPr>
+          <a:xfrm>
+            <a:off x="381000" y="685800"/>
+            <a:ext cx="6096000" cy="3429000"/>
+          </a:xfrm>
+          <a:custGeom>
+            <a:avLst/>
+            <a:gdLst/>
+            <a:ahLst/>
+            <a:cxnLst/>
+            <a:rect l="l" t="t" r="r" b="b"/>
+            <a:pathLst>
+              <a:path w="120000" h="120000" extrusionOk="0">
+                <a:moveTo>
+                  <a:pt x="0" y="0"/>
+                </a:moveTo>
+                <a:lnTo>
+                  <a:pt x="120000" y="0"/>
+                </a:lnTo>
+                <a:lnTo>
+                  <a:pt x="120000" y="120000"/>
+                </a:lnTo>
+                <a:lnTo>
+                  <a:pt x="0" y="120000"/>
+                </a:lnTo>
+                <a:close/>
+              </a:path>
+            </a:pathLst>
+          </a:custGeom>
+        </p:spPr>
+      </p:sp>
+      <p:sp>
+        <p:nvSpPr>
+          <p:cNvPr id="502" name="Google Shape;502;g6b602ea5a7_1_212:notes"/>
+          <p:cNvSpPr txBox="1">
+            <a:spLocks noGrp="1"/>
+          </p:cNvSpPr>
+          <p:nvPr>
+            <p:ph type="body" idx="1"/>
+          </p:nvPr>
+        </p:nvSpPr>
+        <p:spPr>
+          <a:xfrm>
+            <a:off x="685800" y="4343400"/>
+            <a:ext cx="5486400" cy="4114800"/>
+          </a:xfrm>
+          <a:prstGeom prst="rect">
+            <a:avLst/>
+          </a:prstGeom>
+        </p:spPr>
+        <p:txBody>
+          <a:bodyPr spcFirstLastPara="1" wrap="square" lIns="91425" tIns="91425" rIns="91425" bIns="91425" anchor="t" anchorCtr="0">
+            <a:noAutofit/>
+          </a:bodyPr>
+          <a:lstStyle/>
+          <a:p>
+            <a:pPr marL="0" lvl="0" indent="0" algn="l" rtl="0">
+              <a:spcBef>
+                <a:spcPts val="0"/>
+              </a:spcBef>
+              <a:spcAft>
+                <a:spcPts val="0"/>
+              </a:spcAft>
+              <a:buNone/>
+            </a:pPr>
+            <a:endParaRPr/>
+          </a:p>
+        </p:txBody>
+      </p:sp>
+    </p:spTree>
+  </p:cSld>
+  <p:clrMapOvr>
+    <a:masterClrMapping/>
+  </p:clrMapOvr>
+</p:notes>
+</file>
+
+<file path=ppt/notesSlides/notesSlide43.xml><?xml version="1.0" encoding="utf-8"?>
 <p:notes xmlns:a="http://schemas.openxmlformats.org/drawingml/2006/main" xmlns:r="http://schemas.openxmlformats.org/officeDocument/2006/relationships" xmlns:p="http://schemas.openxmlformats.org/presentationml/2006/main" showMasterSp="0" showMasterPhAnim="0">
   <p:cSld>
     <p:spTree>
@@ -24847,7 +25067,7 @@
   <p:cSld>
     <p:spTree>
       <p:nvGrpSpPr>
-        <p:cNvPr id="1" name="Shape 496"/>
+        <p:cNvPr id="1" name="Shape 466"/>
         <p:cNvGrpSpPr/>
         <p:nvPr/>
       </p:nvGrpSpPr>
@@ -24861,7 +25081,7 @@
       </p:grpSpPr>
       <p:sp>
         <p:nvSpPr>
-          <p:cNvPr id="497" name="Google Shape;497;p52"/>
+          <p:cNvPr id="467" name="Google Shape;467;p49"/>
           <p:cNvSpPr txBox="1">
             <a:spLocks noGrp="1"/>
           </p:cNvSpPr>
@@ -24871,8 +25091,8 @@
         </p:nvSpPr>
         <p:spPr>
           <a:xfrm>
-            <a:off x="1828800" y="1453896"/>
-            <a:ext cx="7315200" cy="1501800"/>
+            <a:off x="2286000" y="1104139"/>
+            <a:ext cx="6400800" cy="1501800"/>
           </a:xfrm>
           <a:prstGeom prst="rect">
             <a:avLst/>
@@ -24894,20 +25114,24 @@
               <a:buNone/>
             </a:pPr>
             <a:r>
-              <a:rPr lang="en" sz="6000"/>
-              <a:t>Section </a:t>
-            </a:r>
-            <a:r>
-              <a:rPr lang="en"/>
-              <a:t>C</a:t>
-            </a:r>
-            <a:endParaRPr sz="6000"/>
-          </a:p>
-        </p:txBody>
-      </p:sp>
-      <p:sp>
-        <p:nvSpPr>
-          <p:cNvPr id="498" name="Google Shape;498;p52"/>
+              <a:rPr lang="en" dirty="0"/>
+              <a:t>M</a:t>
+            </a:r>
+            <a:r>
+              <a:rPr lang="en-NL" dirty="0" err="1"/>
+              <a:t>edal</a:t>
+            </a:r>
+            <a:r>
+              <a:rPr lang="en-NL" dirty="0"/>
+              <a:t> Challenges</a:t>
+            </a:r>
+            <a:endParaRPr dirty="0"/>
+          </a:p>
+        </p:txBody>
+      </p:sp>
+      <p:sp>
+        <p:nvSpPr>
+          <p:cNvPr id="468" name="Google Shape;468;p49"/>
           <p:cNvSpPr txBox="1">
             <a:spLocks noGrp="1"/>
           </p:cNvSpPr>
@@ -24917,8 +25141,8 @@
         </p:nvSpPr>
         <p:spPr>
           <a:xfrm>
-            <a:off x="1828800" y="2953512"/>
-            <a:ext cx="7315200" cy="685800"/>
+            <a:off x="2286000" y="2503171"/>
+            <a:ext cx="6400800" cy="685800"/>
           </a:xfrm>
           <a:prstGeom prst="rect">
             <a:avLst/>
@@ -24940,72 +25164,55 @@
               <a:buNone/>
             </a:pPr>
             <a:r>
-              <a:rPr lang="en"/>
-              <a:t>Reflection</a:t>
-            </a:r>
-            <a:endParaRPr sz="3000"/>
-          </a:p>
-        </p:txBody>
-      </p:sp>
-      <p:sp>
-        <p:nvSpPr>
-          <p:cNvPr id="499" name="Google Shape;499;p52"/>
-          <p:cNvSpPr txBox="1"/>
+              <a:rPr lang="en-NL" dirty="0"/>
+              <a:t>Going the extra mile!</a:t>
+            </a:r>
+            <a:endParaRPr dirty="0"/>
+          </a:p>
+        </p:txBody>
+      </p:sp>
+      <p:pic>
+        <p:nvPicPr>
+          <p:cNvPr id="7" name="Graphic 6" descr="Medal">
+            <a:extLst>
+              <a:ext uri="{FF2B5EF4-FFF2-40B4-BE49-F238E27FC236}">
+                <a16:creationId xmlns:a16="http://schemas.microsoft.com/office/drawing/2014/main" id="{2C2C6876-7040-0594-5C65-F9EFF1B3B318}"/>
+              </a:ext>
+            </a:extLst>
+          </p:cNvPr>
+          <p:cNvPicPr>
+            <a:picLocks noChangeAspect="1"/>
+          </p:cNvPicPr>
           <p:nvPr/>
-        </p:nvSpPr>
-        <p:spPr>
-          <a:xfrm>
-            <a:off x="-420624" y="749808"/>
-            <a:ext cx="3383400" cy="5120700"/>
-          </a:xfrm>
-          <a:prstGeom prst="rect">
-            <a:avLst/>
-          </a:prstGeom>
-          <a:noFill/>
-          <a:ln>
-            <a:noFill/>
-          </a:ln>
-        </p:spPr>
-        <p:txBody>
-          <a:bodyPr spcFirstLastPara="1" wrap="square" lIns="0" tIns="0" rIns="0" bIns="0" anchor="ctr" anchorCtr="0">
-            <a:noAutofit/>
-          </a:bodyPr>
-          <a:lstStyle/>
-          <a:p>
-            <a:pPr marL="0" lvl="0" indent="0" algn="l" rtl="0">
-              <a:spcBef>
-                <a:spcPts val="0"/>
-              </a:spcBef>
-              <a:spcAft>
-                <a:spcPts val="0"/>
-              </a:spcAft>
-              <a:buNone/>
-            </a:pPr>
-            <a:r>
-              <a:rPr lang="en" sz="40000">
-                <a:solidFill>
-                  <a:srgbClr val="999999"/>
-                </a:solidFill>
-                <a:latin typeface="Roboto"/>
-                <a:ea typeface="Roboto"/>
-                <a:cs typeface="Roboto"/>
-                <a:sym typeface="Roboto"/>
-              </a:rPr>
-              <a:t>C</a:t>
-            </a:r>
-            <a:endParaRPr sz="40000">
-              <a:solidFill>
-                <a:srgbClr val="999999"/>
-              </a:solidFill>
-              <a:latin typeface="Roboto"/>
-              <a:ea typeface="Roboto"/>
-              <a:cs typeface="Roboto"/>
-              <a:sym typeface="Roboto"/>
-            </a:endParaRPr>
-          </a:p>
-        </p:txBody>
-      </p:sp>
+        </p:nvPicPr>
+        <p:blipFill>
+          <a:blip r:embed="rId3">
+            <a:extLst>
+              <a:ext uri="{96DAC541-7B7A-43D3-8B79-37D633B846F1}">
+                <asvg:svgBlip xmlns:asvg="http://schemas.microsoft.com/office/drawing/2016/SVG/main" r:embed="rId4"/>
+              </a:ext>
+            </a:extLst>
+          </a:blip>
+          <a:stretch>
+            <a:fillRect/>
+          </a:stretch>
+        </p:blipFill>
+        <p:spPr>
+          <a:xfrm>
+            <a:off x="-361666" y="1379845"/>
+            <a:ext cx="3492405" cy="3492405"/>
+          </a:xfrm>
+          <a:prstGeom prst="rect">
+            <a:avLst/>
+          </a:prstGeom>
+        </p:spPr>
+      </p:pic>
     </p:spTree>
+    <p:extLst>
+      <p:ext uri="{BB962C8B-B14F-4D97-AF65-F5344CB8AC3E}">
+        <p14:creationId xmlns:p14="http://schemas.microsoft.com/office/powerpoint/2010/main" val="2832951812"/>
+      </p:ext>
+    </p:extLst>
   </p:cSld>
   <p:clrMapOvr>
     <a:masterClrMapping/>
@@ -25258,6 +25465,511 @@
   <p:cSld>
     <p:spTree>
       <p:nvGrpSpPr>
+        <p:cNvPr id="1" name="Shape 474"/>
+        <p:cNvGrpSpPr/>
+        <p:nvPr/>
+      </p:nvGrpSpPr>
+      <p:grpSpPr>
+        <a:xfrm>
+          <a:off x="0" y="0"/>
+          <a:ext cx="0" cy="0"/>
+          <a:chOff x="0" y="0"/>
+          <a:chExt cx="0" cy="0"/>
+        </a:xfrm>
+      </p:grpSpPr>
+      <p:sp>
+        <p:nvSpPr>
+          <p:cNvPr id="476" name="Google Shape;476;p50"/>
+          <p:cNvSpPr txBox="1">
+            <a:spLocks noGrp="1"/>
+          </p:cNvSpPr>
+          <p:nvPr>
+            <p:ph type="title" idx="2"/>
+          </p:nvPr>
+        </p:nvSpPr>
+        <p:spPr>
+          <a:xfrm>
+            <a:off x="7068300" y="0"/>
+            <a:ext cx="1984200" cy="576000"/>
+          </a:xfrm>
+          <a:prstGeom prst="rect">
+            <a:avLst/>
+          </a:prstGeom>
+        </p:spPr>
+        <p:txBody>
+          <a:bodyPr spcFirstLastPara="1" wrap="square" lIns="91425" tIns="91425" rIns="91425" bIns="91425" anchor="b" anchorCtr="0">
+            <a:noAutofit/>
+          </a:bodyPr>
+          <a:lstStyle/>
+          <a:p>
+            <a:pPr marL="0" lvl="0" indent="0" algn="r" rtl="0">
+              <a:spcBef>
+                <a:spcPts val="0"/>
+              </a:spcBef>
+              <a:spcAft>
+                <a:spcPts val="0"/>
+              </a:spcAft>
+              <a:buNone/>
+            </a:pPr>
+            <a:r>
+              <a:rPr lang="en"/>
+              <a:t>1/1</a:t>
+            </a:r>
+            <a:endParaRPr/>
+          </a:p>
+        </p:txBody>
+      </p:sp>
+      <p:sp>
+        <p:nvSpPr>
+          <p:cNvPr id="477" name="Google Shape;477;p50"/>
+          <p:cNvSpPr txBox="1">
+            <a:spLocks noGrp="1"/>
+          </p:cNvSpPr>
+          <p:nvPr>
+            <p:ph type="body" idx="1"/>
+          </p:nvPr>
+        </p:nvSpPr>
+        <p:spPr>
+          <a:xfrm>
+            <a:off x="182880" y="1069848"/>
+            <a:ext cx="5486400" cy="3895200"/>
+          </a:xfrm>
+          <a:prstGeom prst="rect">
+            <a:avLst/>
+          </a:prstGeom>
+        </p:spPr>
+        <p:txBody>
+          <a:bodyPr spcFirstLastPara="1" wrap="square" lIns="91425" tIns="91425" rIns="91425" bIns="91425" anchor="t" anchorCtr="0">
+            <a:noAutofit/>
+          </a:bodyPr>
+          <a:lstStyle/>
+          <a:p>
+            <a:pPr marL="0" lvl="0" indent="0" algn="l" rtl="0">
+              <a:lnSpc>
+                <a:spcPct val="115000"/>
+              </a:lnSpc>
+              <a:spcBef>
+                <a:spcPts val="0"/>
+              </a:spcBef>
+              <a:spcAft>
+                <a:spcPts val="0"/>
+              </a:spcAft>
+              <a:buNone/>
+            </a:pPr>
+            <a:r>
+              <a:rPr lang="en" sz="900" i="1" dirty="0">
+                <a:solidFill>
+                  <a:schemeClr val="lt1"/>
+                </a:solidFill>
+                <a:latin typeface="Helvetica Neue"/>
+                <a:ea typeface="Helvetica Neue"/>
+                <a:cs typeface="Helvetica Neue"/>
+                <a:sym typeface="Helvetica Neue"/>
+              </a:rPr>
+              <a:t>Show your best examples, do not go overboard, add in short description, you are free to alter this layout (or add slides per evidence) to suit your needs. Just be sure that it is clear.</a:t>
+            </a:r>
+            <a:endParaRPr sz="900" dirty="0">
+              <a:solidFill>
+                <a:schemeClr val="lt1"/>
+              </a:solidFill>
+            </a:endParaRPr>
+          </a:p>
+          <a:p>
+            <a:pPr marL="0" lvl="0" indent="0" algn="l" rtl="0">
+              <a:lnSpc>
+                <a:spcPct val="115000"/>
+              </a:lnSpc>
+              <a:spcBef>
+                <a:spcPts val="0"/>
+              </a:spcBef>
+              <a:spcAft>
+                <a:spcPts val="0"/>
+              </a:spcAft>
+              <a:buNone/>
+            </a:pPr>
+            <a:endParaRPr sz="700" i="1" dirty="0">
+              <a:solidFill>
+                <a:schemeClr val="lt1"/>
+              </a:solidFill>
+              <a:latin typeface="Helvetica Neue"/>
+              <a:ea typeface="Helvetica Neue"/>
+              <a:cs typeface="Helvetica Neue"/>
+              <a:sym typeface="Helvetica Neue"/>
+            </a:endParaRPr>
+          </a:p>
+        </p:txBody>
+      </p:sp>
+      <p:sp>
+        <p:nvSpPr>
+          <p:cNvPr id="480" name="Google Shape;480;p50"/>
+          <p:cNvSpPr txBox="1">
+            <a:spLocks noGrp="1"/>
+          </p:cNvSpPr>
+          <p:nvPr>
+            <p:ph type="title" idx="5"/>
+          </p:nvPr>
+        </p:nvSpPr>
+        <p:spPr>
+          <a:xfrm>
+            <a:off x="845550" y="576000"/>
+            <a:ext cx="7315200" cy="493800"/>
+          </a:xfrm>
+          <a:prstGeom prst="rect">
+            <a:avLst/>
+          </a:prstGeom>
+        </p:spPr>
+        <p:txBody>
+          <a:bodyPr spcFirstLastPara="1" wrap="square" lIns="91425" tIns="91425" rIns="91425" bIns="91425" anchor="ctr" anchorCtr="0">
+            <a:noAutofit/>
+          </a:bodyPr>
+          <a:lstStyle/>
+          <a:p>
+            <a:pPr marL="0" lvl="0" indent="0" algn="l" rtl="0">
+              <a:spcBef>
+                <a:spcPts val="0"/>
+              </a:spcBef>
+              <a:spcAft>
+                <a:spcPts val="0"/>
+              </a:spcAft>
+              <a:buNone/>
+            </a:pPr>
+            <a:r>
+              <a:rPr lang="en-GB" dirty="0"/>
+              <a:t>P</a:t>
+            </a:r>
+            <a:r>
+              <a:rPr lang="en-NL" dirty="0" err="1"/>
+              <a:t>ut</a:t>
+            </a:r>
+            <a:r>
+              <a:rPr lang="en-NL" dirty="0"/>
+              <a:t> your evidence down here to receive a medal!</a:t>
+            </a:r>
+            <a:endParaRPr lang="en-GB" dirty="0"/>
+          </a:p>
+        </p:txBody>
+      </p:sp>
+      <p:sp>
+        <p:nvSpPr>
+          <p:cNvPr id="7" name="Google Shape;459;p48">
+            <a:extLst>
+              <a:ext uri="{FF2B5EF4-FFF2-40B4-BE49-F238E27FC236}">
+                <a16:creationId xmlns:a16="http://schemas.microsoft.com/office/drawing/2014/main" id="{5161B9CD-FD90-1846-8EE0-48554F0A839A}"/>
+              </a:ext>
+            </a:extLst>
+          </p:cNvPr>
+          <p:cNvSpPr txBox="1">
+            <a:spLocks noGrp="1"/>
+          </p:cNvSpPr>
+          <p:nvPr>
+            <p:ph type="title" idx="3"/>
+          </p:nvPr>
+        </p:nvSpPr>
+        <p:spPr>
+          <a:xfrm>
+            <a:off x="2049462" y="0"/>
+            <a:ext cx="4206300" cy="576000"/>
+          </a:xfrm>
+          <a:prstGeom prst="rect">
+            <a:avLst/>
+          </a:prstGeom>
+        </p:spPr>
+        <p:txBody>
+          <a:bodyPr spcFirstLastPara="1" wrap="square" lIns="91425" tIns="91425" rIns="91425" bIns="91425" anchor="ctr" anchorCtr="0">
+            <a:noAutofit/>
+          </a:bodyPr>
+          <a:lstStyle/>
+          <a:p>
+            <a:pPr marL="0" lvl="0" indent="0" algn="l" rtl="0">
+              <a:spcBef>
+                <a:spcPts val="0"/>
+              </a:spcBef>
+              <a:spcAft>
+                <a:spcPts val="0"/>
+              </a:spcAft>
+              <a:buNone/>
+            </a:pPr>
+            <a:r>
+              <a:rPr lang="en-NL" dirty="0"/>
+              <a:t>Going the extra mile!</a:t>
+            </a:r>
+            <a:endParaRPr lang="en-GB" dirty="0"/>
+          </a:p>
+        </p:txBody>
+      </p:sp>
+      <p:sp>
+        <p:nvSpPr>
+          <p:cNvPr id="2" name="Google Shape;462;p48">
+            <a:extLst>
+              <a:ext uri="{FF2B5EF4-FFF2-40B4-BE49-F238E27FC236}">
+                <a16:creationId xmlns:a16="http://schemas.microsoft.com/office/drawing/2014/main" id="{504CBF35-FBEA-FA87-F016-E6278C3C94BB}"/>
+              </a:ext>
+            </a:extLst>
+          </p:cNvPr>
+          <p:cNvSpPr txBox="1">
+            <a:spLocks noGrp="1"/>
+          </p:cNvSpPr>
+          <p:nvPr>
+            <p:ph type="title" idx="6"/>
+          </p:nvPr>
+        </p:nvSpPr>
+        <p:spPr>
+          <a:xfrm>
+            <a:off x="845550" y="0"/>
+            <a:ext cx="1368600" cy="576000"/>
+          </a:xfrm>
+          <a:prstGeom prst="rect">
+            <a:avLst/>
+          </a:prstGeom>
+        </p:spPr>
+        <p:txBody>
+          <a:bodyPr spcFirstLastPara="1" wrap="square" lIns="91425" tIns="91425" rIns="91425" bIns="91425" anchor="ctr" anchorCtr="0">
+            <a:noAutofit/>
+          </a:bodyPr>
+          <a:lstStyle/>
+          <a:p>
+            <a:pPr marL="0" lvl="0" indent="0" algn="l" rtl="0">
+              <a:spcBef>
+                <a:spcPts val="0"/>
+              </a:spcBef>
+              <a:spcAft>
+                <a:spcPts val="0"/>
+              </a:spcAft>
+              <a:buNone/>
+            </a:pPr>
+            <a:r>
+              <a:rPr lang="en-NL" dirty="0"/>
+              <a:t>Medal Challenges</a:t>
+            </a:r>
+            <a:endParaRPr lang="en-US" dirty="0"/>
+          </a:p>
+        </p:txBody>
+      </p:sp>
+      <p:pic>
+        <p:nvPicPr>
+          <p:cNvPr id="12" name="Graphic 11" descr="Medal">
+            <a:extLst>
+              <a:ext uri="{FF2B5EF4-FFF2-40B4-BE49-F238E27FC236}">
+                <a16:creationId xmlns:a16="http://schemas.microsoft.com/office/drawing/2014/main" id="{DAEAD1FE-ADA8-7092-2C63-52D1D8722E05}"/>
+              </a:ext>
+            </a:extLst>
+          </p:cNvPr>
+          <p:cNvPicPr>
+            <a:picLocks noChangeAspect="1"/>
+          </p:cNvPicPr>
+          <p:nvPr/>
+        </p:nvPicPr>
+        <p:blipFill>
+          <a:blip r:embed="rId3">
+            <a:extLst>
+              <a:ext uri="{96DAC541-7B7A-43D3-8B79-37D633B846F1}">
+                <asvg:svgBlip xmlns:asvg="http://schemas.microsoft.com/office/drawing/2016/SVG/main" r:embed="rId4"/>
+              </a:ext>
+            </a:extLst>
+          </a:blip>
+          <a:stretch>
+            <a:fillRect/>
+          </a:stretch>
+        </p:blipFill>
+        <p:spPr>
+          <a:xfrm>
+            <a:off x="245771" y="58096"/>
+            <a:ext cx="459808" cy="459808"/>
+          </a:xfrm>
+          <a:prstGeom prst="rect">
+            <a:avLst/>
+          </a:prstGeom>
+        </p:spPr>
+      </p:pic>
+    </p:spTree>
+    <p:extLst>
+      <p:ext uri="{BB962C8B-B14F-4D97-AF65-F5344CB8AC3E}">
+        <p14:creationId xmlns:p14="http://schemas.microsoft.com/office/powerpoint/2010/main" val="3318464680"/>
+      </p:ext>
+    </p:extLst>
+  </p:cSld>
+  <p:clrMapOvr>
+    <a:masterClrMapping/>
+  </p:clrMapOvr>
+</p:sld>
+</file>
+
+<file path=ppt/slides/slide41.xml><?xml version="1.0" encoding="utf-8"?>
+<p:sld xmlns:a="http://schemas.openxmlformats.org/drawingml/2006/main" xmlns:r="http://schemas.openxmlformats.org/officeDocument/2006/relationships" xmlns:p="http://schemas.openxmlformats.org/presentationml/2006/main">
+  <p:cSld>
+    <p:spTree>
+      <p:nvGrpSpPr>
+        <p:cNvPr id="1" name="Shape 496"/>
+        <p:cNvGrpSpPr/>
+        <p:nvPr/>
+      </p:nvGrpSpPr>
+      <p:grpSpPr>
+        <a:xfrm>
+          <a:off x="0" y="0"/>
+          <a:ext cx="0" cy="0"/>
+          <a:chOff x="0" y="0"/>
+          <a:chExt cx="0" cy="0"/>
+        </a:xfrm>
+      </p:grpSpPr>
+      <p:sp>
+        <p:nvSpPr>
+          <p:cNvPr id="497" name="Google Shape;497;p52"/>
+          <p:cNvSpPr txBox="1">
+            <a:spLocks noGrp="1"/>
+          </p:cNvSpPr>
+          <p:nvPr>
+            <p:ph type="ctrTitle"/>
+          </p:nvPr>
+        </p:nvSpPr>
+        <p:spPr>
+          <a:xfrm>
+            <a:off x="1828800" y="1453896"/>
+            <a:ext cx="7315200" cy="1501800"/>
+          </a:xfrm>
+          <a:prstGeom prst="rect">
+            <a:avLst/>
+          </a:prstGeom>
+        </p:spPr>
+        <p:txBody>
+          <a:bodyPr spcFirstLastPara="1" wrap="square" lIns="91425" tIns="91425" rIns="91425" bIns="91425" anchor="ctr" anchorCtr="0">
+            <a:noAutofit/>
+          </a:bodyPr>
+          <a:lstStyle/>
+          <a:p>
+            <a:pPr marL="0" lvl="0" indent="0" algn="ctr" rtl="0">
+              <a:spcBef>
+                <a:spcPts val="0"/>
+              </a:spcBef>
+              <a:spcAft>
+                <a:spcPts val="0"/>
+              </a:spcAft>
+              <a:buNone/>
+            </a:pPr>
+            <a:r>
+              <a:rPr lang="en" sz="6000"/>
+              <a:t>Section </a:t>
+            </a:r>
+            <a:r>
+              <a:rPr lang="en"/>
+              <a:t>C</a:t>
+            </a:r>
+            <a:endParaRPr sz="6000"/>
+          </a:p>
+        </p:txBody>
+      </p:sp>
+      <p:sp>
+        <p:nvSpPr>
+          <p:cNvPr id="498" name="Google Shape;498;p52"/>
+          <p:cNvSpPr txBox="1">
+            <a:spLocks noGrp="1"/>
+          </p:cNvSpPr>
+          <p:nvPr>
+            <p:ph type="subTitle" idx="1"/>
+          </p:nvPr>
+        </p:nvSpPr>
+        <p:spPr>
+          <a:xfrm>
+            <a:off x="1828800" y="2953512"/>
+            <a:ext cx="7315200" cy="685800"/>
+          </a:xfrm>
+          <a:prstGeom prst="rect">
+            <a:avLst/>
+          </a:prstGeom>
+        </p:spPr>
+        <p:txBody>
+          <a:bodyPr spcFirstLastPara="1" wrap="square" lIns="91425" tIns="91425" rIns="91425" bIns="91425" anchor="ctr" anchorCtr="0">
+            <a:noAutofit/>
+          </a:bodyPr>
+          <a:lstStyle/>
+          <a:p>
+            <a:pPr marL="0" lvl="0" indent="0" algn="ctr" rtl="0">
+              <a:spcBef>
+                <a:spcPts val="0"/>
+              </a:spcBef>
+              <a:spcAft>
+                <a:spcPts val="0"/>
+              </a:spcAft>
+              <a:buNone/>
+            </a:pPr>
+            <a:r>
+              <a:rPr lang="en"/>
+              <a:t>Reflection</a:t>
+            </a:r>
+            <a:endParaRPr sz="3000"/>
+          </a:p>
+        </p:txBody>
+      </p:sp>
+      <p:sp>
+        <p:nvSpPr>
+          <p:cNvPr id="499" name="Google Shape;499;p52"/>
+          <p:cNvSpPr txBox="1"/>
+          <p:nvPr/>
+        </p:nvSpPr>
+        <p:spPr>
+          <a:xfrm>
+            <a:off x="-420624" y="749808"/>
+            <a:ext cx="3383400" cy="5120700"/>
+          </a:xfrm>
+          <a:prstGeom prst="rect">
+            <a:avLst/>
+          </a:prstGeom>
+          <a:noFill/>
+          <a:ln>
+            <a:noFill/>
+          </a:ln>
+        </p:spPr>
+        <p:txBody>
+          <a:bodyPr spcFirstLastPara="1" wrap="square" lIns="0" tIns="0" rIns="0" bIns="0" anchor="ctr" anchorCtr="0">
+            <a:noAutofit/>
+          </a:bodyPr>
+          <a:lstStyle/>
+          <a:p>
+            <a:pPr marL="0" lvl="0" indent="0" algn="l" rtl="0">
+              <a:spcBef>
+                <a:spcPts val="0"/>
+              </a:spcBef>
+              <a:spcAft>
+                <a:spcPts val="0"/>
+              </a:spcAft>
+              <a:buNone/>
+            </a:pPr>
+            <a:r>
+              <a:rPr lang="en" sz="40000">
+                <a:solidFill>
+                  <a:srgbClr val="999999"/>
+                </a:solidFill>
+                <a:latin typeface="Roboto"/>
+                <a:ea typeface="Roboto"/>
+                <a:cs typeface="Roboto"/>
+                <a:sym typeface="Roboto"/>
+              </a:rPr>
+              <a:t>C</a:t>
+            </a:r>
+            <a:endParaRPr sz="40000">
+              <a:solidFill>
+                <a:srgbClr val="999999"/>
+              </a:solidFill>
+              <a:latin typeface="Roboto"/>
+              <a:ea typeface="Roboto"/>
+              <a:cs typeface="Roboto"/>
+              <a:sym typeface="Roboto"/>
+            </a:endParaRPr>
+          </a:p>
+        </p:txBody>
+      </p:sp>
+    </p:spTree>
+  </p:cSld>
+  <p:clrMapOvr>
+    <a:masterClrMapping/>
+  </p:clrMapOvr>
+</p:sld>
+</file>
+
+<file path=ppt/slides/slide42.xml><?xml version="1.0" encoding="utf-8"?>
+<p:sld xmlns:a="http://schemas.openxmlformats.org/drawingml/2006/main" xmlns:r="http://schemas.openxmlformats.org/officeDocument/2006/relationships" xmlns:p="http://schemas.openxmlformats.org/presentationml/2006/main">
+  <p:cSld>
+    <p:spTree>
+      <p:nvGrpSpPr>
         <p:cNvPr id="1" name="Shape 503"/>
         <p:cNvGrpSpPr/>
         <p:nvPr/>
@@ -25576,7 +26288,7 @@
 </p:sld>
 </file>
 
-<file path=ppt/slides/slide41.xml><?xml version="1.0" encoding="utf-8"?>
+<file path=ppt/slides/slide43.xml><?xml version="1.0" encoding="utf-8"?>
 <p:sld xmlns:a="http://schemas.openxmlformats.org/drawingml/2006/main" xmlns:r="http://schemas.openxmlformats.org/officeDocument/2006/relationships" xmlns:p="http://schemas.openxmlformats.org/presentationml/2006/main">
   <p:cSld>
     <p:spTree>
@@ -29428,6 +30140,14 @@
 </file>
 
 <file path=customXml/item1.xml><?xml version="1.0" encoding="utf-8"?>
+<p:properties xmlns:p="http://schemas.microsoft.com/office/2006/metadata/properties" xmlns:xsi="http://www.w3.org/2001/XMLSchema-instance" xmlns:pc="http://schemas.microsoft.com/office/infopath/2007/PartnerControls">
+  <documentManagement>
+    <ReferenceId xmlns="c152f6e4-8646-42a0-bdef-6957e39d6540" xsi:nil="true"/>
+  </documentManagement>
+</p:properties>
+</file>
+
+<file path=customXml/item2.xml><?xml version="1.0" encoding="utf-8"?>
 <?mso-contentType ?>
 <FormTemplates xmlns="http://schemas.microsoft.com/sharepoint/v3/contenttype/forms">
   <Display>DocumentLibraryForm</Display>
@@ -29436,7 +30156,7 @@
 </FormTemplates>
 </file>
 
-<file path=customXml/item2.xml><?xml version="1.0" encoding="utf-8"?>
+<file path=customXml/item3.xml><?xml version="1.0" encoding="utf-8"?>
 <ct:contentTypeSchema xmlns:ct="http://schemas.microsoft.com/office/2006/metadata/contentType" xmlns:ma="http://schemas.microsoft.com/office/2006/metadata/properties/metaAttributes" ct:_="" ma:_="" ma:contentTypeName="Document" ma:contentTypeID="0x01010060D07512EFF14A4ABD044BE0FCD6C60D" ma:contentTypeVersion="3" ma:contentTypeDescription="Create a new document." ma:contentTypeScope="" ma:versionID="c2b15550350b222693d659ce129ff451">
   <xsd:schema xmlns:xsd="http://www.w3.org/2001/XMLSchema" xmlns:xs="http://www.w3.org/2001/XMLSchema" xmlns:p="http://schemas.microsoft.com/office/2006/metadata/properties" xmlns:ns2="c152f6e4-8646-42a0-bdef-6957e39d6540" targetNamespace="http://schemas.microsoft.com/office/2006/metadata/properties" ma:root="true" ma:fieldsID="1d336d9eed8042ae42b1aad047849339" ns2:_="">
     <xsd:import namespace="c152f6e4-8646-42a0-bdef-6957e39d6540"/>
@@ -29574,15 +30294,24 @@
 </ct:contentTypeSchema>
 </file>
 
-<file path=customXml/item3.xml><?xml version="1.0" encoding="utf-8"?>
-<p:properties xmlns:p="http://schemas.microsoft.com/office/2006/metadata/properties" xmlns:xsi="http://www.w3.org/2001/XMLSchema-instance" xmlns:pc="http://schemas.microsoft.com/office/infopath/2007/PartnerControls">
-  <documentManagement>
-    <ReferenceId xmlns="c152f6e4-8646-42a0-bdef-6957e39d6540" xsi:nil="true"/>
-  </documentManagement>
-</p:properties>
+<file path=customXml/itemProps1.xml><?xml version="1.0" encoding="utf-8"?>
+<ds:datastoreItem xmlns:ds="http://schemas.openxmlformats.org/officeDocument/2006/customXml" ds:itemID="{3067B86F-F5BB-4BE6-9A37-0E19E53CB68B}">
+  <ds:schemaRefs>
+    <ds:schemaRef ds:uri="04457b0b-0490-4995-8f27-e0b7141e5786"/>
+    <ds:schemaRef ds:uri="http://purl.org/dc/dcmitype/"/>
+    <ds:schemaRef ds:uri="http://purl.org/dc/elements/1.1/"/>
+    <ds:schemaRef ds:uri="http://purl.org/dc/terms/"/>
+    <ds:schemaRef ds:uri="http://schemas.microsoft.com/office/2006/documentManagement/types"/>
+    <ds:schemaRef ds:uri="http://schemas.microsoft.com/office/2006/metadata/properties"/>
+    <ds:schemaRef ds:uri="http://schemas.microsoft.com/office/infopath/2007/PartnerControls"/>
+    <ds:schemaRef ds:uri="http://schemas.openxmlformats.org/package/2006/metadata/core-properties"/>
+    <ds:schemaRef ds:uri="http://www.w3.org/XML/1998/namespace"/>
+    <ds:schemaRef ds:uri="c152f6e4-8646-42a0-bdef-6957e39d6540"/>
+  </ds:schemaRefs>
+</ds:datastoreItem>
 </file>
 
-<file path=customXml/itemProps1.xml><?xml version="1.0" encoding="utf-8"?>
+<file path=customXml/itemProps2.xml><?xml version="1.0" encoding="utf-8"?>
 <ds:datastoreItem xmlns:ds="http://schemas.openxmlformats.org/officeDocument/2006/customXml" ds:itemID="{98D9791E-52D0-4ABB-925A-4EAECF798D9B}">
   <ds:schemaRefs>
     <ds:schemaRef ds:uri="http://schemas.microsoft.com/sharepoint/v3/contenttype/forms"/>
@@ -29590,7 +30319,7 @@
 </ds:datastoreItem>
 </file>
 
-<file path=customXml/itemProps2.xml><?xml version="1.0" encoding="utf-8"?>
+<file path=customXml/itemProps3.xml><?xml version="1.0" encoding="utf-8"?>
 <ds:datastoreItem xmlns:ds="http://schemas.openxmlformats.org/officeDocument/2006/customXml" ds:itemID="{4F96C4B0-FAA7-4740-B299-8221BDCA7209}">
   <ds:schemaRefs>
     <ds:schemaRef ds:uri="http://schemas.microsoft.com/office/2006/metadata/contentType"/>
@@ -29606,21 +30335,4 @@
     <ds:schemaRef ds:uri="http://schemas.microsoft.com/internal/obd"/>
   </ds:schemaRefs>
 </ds:datastoreItem>
-</file>
-
-<file path=customXml/itemProps3.xml><?xml version="1.0" encoding="utf-8"?>
-<ds:datastoreItem xmlns:ds="http://schemas.openxmlformats.org/officeDocument/2006/customXml" ds:itemID="{3067B86F-F5BB-4BE6-9A37-0E19E53CB68B}">
-  <ds:schemaRefs>
-    <ds:schemaRef ds:uri="04457b0b-0490-4995-8f27-e0b7141e5786"/>
-    <ds:schemaRef ds:uri="http://purl.org/dc/dcmitype/"/>
-    <ds:schemaRef ds:uri="http://purl.org/dc/elements/1.1/"/>
-    <ds:schemaRef ds:uri="http://purl.org/dc/terms/"/>
-    <ds:schemaRef ds:uri="http://schemas.microsoft.com/office/2006/documentManagement/types"/>
-    <ds:schemaRef ds:uri="http://schemas.microsoft.com/office/2006/metadata/properties"/>
-    <ds:schemaRef ds:uri="http://schemas.microsoft.com/office/infopath/2007/PartnerControls"/>
-    <ds:schemaRef ds:uri="http://schemas.openxmlformats.org/package/2006/metadata/core-properties"/>
-    <ds:schemaRef ds:uri="http://www.w3.org/XML/1998/namespace"/>
-    <ds:schemaRef ds:uri="c152f6e4-8646-42a0-bdef-6957e39d6540"/>
-  </ds:schemaRefs>
-</ds:datastoreItem>
 </file>
</xml_diff>